<commit_message>
Move around files and rename dirs.
</commit_message>
<xml_diff>
--- a/Presentations/01 Python编程概述.pptx
+++ b/Presentations/01 Python编程概述.pptx
@@ -9860,48 +9860,24 @@
             <a:endParaRPr lang="en-US" altLang="zh-CN" dirty="0"/>
           </a:p>
           <a:p>
-            <a:pPr lvl="1"/>
-            <a:r>
-              <a:rPr lang="en-US" altLang="zh-CN" dirty="0"/>
+            <a:r>
+              <a:rPr lang="en-US" altLang="zh-CN"/>
               <a:t>Python</a:t>
             </a:r>
             <a:r>
-              <a:rPr lang="zh-CN" altLang="en-US" dirty="0"/>
-              <a:t>语言的介绍</a:t>
-            </a:r>
-            <a:endParaRPr lang="en-US" altLang="zh-CN" dirty="0"/>
-          </a:p>
-          <a:p>
-            <a:pPr lvl="1"/>
-            <a:r>
-              <a:rPr lang="en-US" altLang="zh-CN" dirty="0"/>
+              <a:rPr lang="zh-CN" altLang="en-US"/>
+              <a:t>课程项目</a:t>
+            </a:r>
+            <a:endParaRPr lang="en-US" altLang="zh-CN"/>
+          </a:p>
+          <a:p>
+            <a:r>
+              <a:rPr lang="en-US" altLang="zh-CN"/>
               <a:t>Python</a:t>
             </a:r>
             <a:r>
-              <a:rPr lang="zh-CN" altLang="en-US" dirty="0"/>
-              <a:t>与其他编程语言的对比</a:t>
-            </a:r>
-            <a:endParaRPr lang="en-US" altLang="zh-CN" dirty="0"/>
-          </a:p>
-          <a:p>
-            <a:r>
-              <a:rPr lang="en-US" altLang="zh-CN" dirty="0"/>
-              <a:t>Python</a:t>
-            </a:r>
-            <a:r>
-              <a:rPr lang="zh-CN" altLang="en-US" dirty="0"/>
-              <a:t>开发环境</a:t>
-            </a:r>
-            <a:endParaRPr lang="en-US" altLang="zh-CN" dirty="0"/>
-          </a:p>
-          <a:p>
-            <a:r>
-              <a:rPr lang="en-US" altLang="zh-CN" dirty="0"/>
-              <a:t>Python</a:t>
-            </a:r>
-            <a:r>
-              <a:rPr lang="zh-CN" altLang="en-US" dirty="0"/>
-              <a:t>应用展示</a:t>
+              <a:rPr lang="zh-CN" altLang="en-US"/>
+              <a:t>的应用</a:t>
             </a:r>
             <a:endParaRPr lang="en-US" altLang="zh-CN" dirty="0"/>
           </a:p>

</xml_diff>

<commit_message>
create and edit the lecture01 notebook.
</commit_message>
<xml_diff>
--- a/Presentations/01 Python编程概述.pptx
+++ b/Presentations/01 Python编程概述.pptx
@@ -10795,7 +10795,7 @@
         </p:spPr>
         <p:txBody>
           <a:bodyPr>
-            <a:normAutofit/>
+            <a:normAutofit lnSpcReduction="10000"/>
           </a:bodyPr>
           <a:lstStyle/>
           <a:p>
@@ -10825,18 +10825,26 @@
               <a:t>Web</a:t>
             </a:r>
             <a:r>
-              <a:rPr lang="zh-CN" altLang="en-US" dirty="0"/>
+              <a:rPr lang="zh-CN" altLang="en-US"/>
               <a:t>应用开发</a:t>
             </a:r>
-            <a:r>
-              <a:rPr lang="en-US" altLang="zh-CN" dirty="0"/>
-              <a:t>(Django)</a:t>
-            </a:r>
-          </a:p>
-          <a:p>
-            <a:r>
-              <a:rPr lang="zh-CN" altLang="en-US" dirty="0"/>
-              <a:t>命令行程序</a:t>
+            <a:endParaRPr lang="en-US" altLang="zh-CN"/>
+          </a:p>
+          <a:p>
+            <a:r>
+              <a:rPr lang="zh-CN" altLang="en-US"/>
+              <a:t>服务器管理</a:t>
+            </a:r>
+            <a:endParaRPr lang="en-US" altLang="zh-CN"/>
+          </a:p>
+          <a:p>
+            <a:r>
+              <a:rPr lang="zh-CN" altLang="en-US"/>
+              <a:t>命令行</a:t>
+            </a:r>
+            <a:r>
+              <a:rPr lang="zh-CN" altLang="en-US" dirty="0"/>
+              <a:t>程序</a:t>
             </a:r>
             <a:endParaRPr lang="en-US" altLang="zh-CN" dirty="0"/>
           </a:p>

</xml_diff>